<commit_message>
added 1 more slide
</commit_message>
<xml_diff>
--- a/Documents/Radiology Information System presentationVER00.01.pptx
+++ b/Documents/Radiology Information System presentationVER00.01.pptx
@@ -15,6 +15,7 @@
     <p:sldId id="263" r:id="rId9"/>
     <p:sldId id="264" r:id="rId10"/>
     <p:sldId id="265" r:id="rId11"/>
+    <p:sldId id="266" r:id="rId12"/>
   </p:sldIdLst>
   <p:sldSz cx="9144000" cy="6858000" type="screen4x3"/>
   <p:notesSz cx="6858000" cy="9144000"/>
@@ -130,6 +131,59 @@
     </p:ext>
   </p:extLst>
 </p:presentation>
+</file>
+
+<file path=ppt/changesInfos/changesInfo1.xml><?xml version="1.0" encoding="utf-8"?>
+<pc:chgInfo xmlns:a="http://schemas.openxmlformats.org/drawingml/2006/main" xmlns:r="http://schemas.openxmlformats.org/officeDocument/2006/relationships" xmlns:ac="http://schemas.microsoft.com/office/drawing/2013/main/command" xmlns:pc="http://schemas.microsoft.com/office/powerpoint/2013/main/command">
+  <pc:docChgLst>
+    <pc:chgData name="kyle remillard" userId="9198aa0cd704f169" providerId="LiveId" clId="{ABA40D92-2422-4BA7-AAE6-C54EBAFAAE16}"/>
+    <pc:docChg chg="undo addSld modSld">
+      <pc:chgData name="kyle remillard" userId="9198aa0cd704f169" providerId="LiveId" clId="{ABA40D92-2422-4BA7-AAE6-C54EBAFAAE16}" dt="2018-04-22T01:05:38.533" v="259" actId="732"/>
+      <pc:docMkLst>
+        <pc:docMk/>
+      </pc:docMkLst>
+      <pc:sldChg chg="addSp modSp add">
+        <pc:chgData name="kyle remillard" userId="9198aa0cd704f169" providerId="LiveId" clId="{ABA40D92-2422-4BA7-AAE6-C54EBAFAAE16}" dt="2018-04-22T01:05:38.533" v="259" actId="732"/>
+        <pc:sldMkLst>
+          <pc:docMk/>
+          <pc:sldMk cId="2800904959" sldId="266"/>
+        </pc:sldMkLst>
+        <pc:spChg chg="mod">
+          <ac:chgData name="kyle remillard" userId="9198aa0cd704f169" providerId="LiveId" clId="{ABA40D92-2422-4BA7-AAE6-C54EBAFAAE16}" dt="2018-04-22T00:59:24.426" v="7" actId="20577"/>
+          <ac:spMkLst>
+            <pc:docMk/>
+            <pc:sldMk cId="2800904959" sldId="266"/>
+            <ac:spMk id="2" creationId="{F22FC981-E2F0-4B66-82A5-DDC7E298F95B}"/>
+          </ac:spMkLst>
+        </pc:spChg>
+        <pc:spChg chg="add mod">
+          <ac:chgData name="kyle remillard" userId="9198aa0cd704f169" providerId="LiveId" clId="{ABA40D92-2422-4BA7-AAE6-C54EBAFAAE16}" dt="2018-04-22T01:01:35.043" v="246" actId="1076"/>
+          <ac:spMkLst>
+            <pc:docMk/>
+            <pc:sldMk cId="2800904959" sldId="266"/>
+            <ac:spMk id="3" creationId="{B4CF3260-3AB8-498F-9DEC-68C342A3C7B9}"/>
+          </ac:spMkLst>
+        </pc:spChg>
+        <pc:picChg chg="add mod">
+          <ac:chgData name="kyle remillard" userId="9198aa0cd704f169" providerId="LiveId" clId="{ABA40D92-2422-4BA7-AAE6-C54EBAFAAE16}" dt="2018-04-22T01:03:29.040" v="250" actId="1076"/>
+          <ac:picMkLst>
+            <pc:docMk/>
+            <pc:sldMk cId="2800904959" sldId="266"/>
+            <ac:picMk id="5" creationId="{80F30078-A849-49C0-A4FF-8ABB9FDCD762}"/>
+          </ac:picMkLst>
+        </pc:picChg>
+        <pc:picChg chg="add mod ord modCrop">
+          <ac:chgData name="kyle remillard" userId="9198aa0cd704f169" providerId="LiveId" clId="{ABA40D92-2422-4BA7-AAE6-C54EBAFAAE16}" dt="2018-04-22T01:05:38.533" v="259" actId="732"/>
+          <ac:picMkLst>
+            <pc:docMk/>
+            <pc:sldMk cId="2800904959" sldId="266"/>
+            <ac:picMk id="7" creationId="{C6155E10-F139-4229-AAF8-860528875752}"/>
+          </ac:picMkLst>
+        </pc:picChg>
+      </pc:sldChg>
+    </pc:docChg>
+  </pc:docChgLst>
+</pc:chgInfo>
 </file>
 
 <file path=ppt/slideLayouts/slideLayout1.xml><?xml version="1.0" encoding="utf-8"?>
@@ -3295,6 +3349,204 @@
     <p:extLst>
       <p:ext uri="{BB962C8B-B14F-4D97-AF65-F5344CB8AC3E}">
         <p14:creationId xmlns:p14="http://schemas.microsoft.com/office/powerpoint/2010/main" val="635389955"/>
+      </p:ext>
+    </p:extLst>
+  </p:cSld>
+  <p:clrMapOvr>
+    <a:masterClrMapping/>
+  </p:clrMapOvr>
+</p:sld>
+</file>
+
+<file path=ppt/slides/slide11.xml><?xml version="1.0" encoding="utf-8"?>
+<p:sld xmlns:a="http://schemas.openxmlformats.org/drawingml/2006/main" xmlns:r="http://schemas.openxmlformats.org/officeDocument/2006/relationships" xmlns:p="http://schemas.openxmlformats.org/presentationml/2006/main">
+  <p:cSld>
+    <p:spTree>
+      <p:nvGrpSpPr>
+        <p:cNvPr id="1" name=""/>
+        <p:cNvGrpSpPr/>
+        <p:nvPr/>
+      </p:nvGrpSpPr>
+      <p:grpSpPr>
+        <a:xfrm>
+          <a:off x="0" y="0"/>
+          <a:ext cx="0" cy="0"/>
+          <a:chOff x="0" y="0"/>
+          <a:chExt cx="0" cy="0"/>
+        </a:xfrm>
+      </p:grpSpPr>
+      <p:pic>
+        <p:nvPicPr>
+          <p:cNvPr id="7" name="Picture 6">
+            <a:extLst>
+              <a:ext uri="{FF2B5EF4-FFF2-40B4-BE49-F238E27FC236}">
+                <a16:creationId xmlns:a16="http://schemas.microsoft.com/office/drawing/2014/main" id="{C6155E10-F139-4229-AAF8-860528875752}"/>
+              </a:ext>
+            </a:extLst>
+          </p:cNvPr>
+          <p:cNvPicPr>
+            <a:picLocks noChangeAspect="1"/>
+          </p:cNvPicPr>
+          <p:nvPr/>
+        </p:nvPicPr>
+        <p:blipFill rotWithShape="1">
+          <a:blip r:embed="rId2">
+            <a:extLst>
+              <a:ext uri="{28A0092B-C50C-407E-A947-70E740481C1C}">
+                <a14:useLocalDpi xmlns:a14="http://schemas.microsoft.com/office/drawing/2010/main" val="0"/>
+              </a:ext>
+            </a:extLst>
+          </a:blip>
+          <a:srcRect r="6647" b="37292"/>
+          <a:stretch/>
+        </p:blipFill>
+        <p:spPr>
+          <a:xfrm>
+            <a:off x="4876801" y="2557528"/>
+            <a:ext cx="4257868" cy="4300472"/>
+          </a:xfrm>
+          <a:prstGeom prst="rect">
+            <a:avLst/>
+          </a:prstGeom>
+        </p:spPr>
+      </p:pic>
+      <p:sp>
+        <p:nvSpPr>
+          <p:cNvPr id="2" name="Title 1">
+            <a:extLst>
+              <a:ext uri="{FF2B5EF4-FFF2-40B4-BE49-F238E27FC236}">
+                <a16:creationId xmlns:a16="http://schemas.microsoft.com/office/drawing/2014/main" id="{F22FC981-E2F0-4B66-82A5-DDC7E298F95B}"/>
+              </a:ext>
+            </a:extLst>
+          </p:cNvPr>
+          <p:cNvSpPr>
+            <a:spLocks noGrp="1"/>
+          </p:cNvSpPr>
+          <p:nvPr>
+            <p:ph type="title"/>
+          </p:nvPr>
+        </p:nvSpPr>
+        <p:spPr/>
+        <p:txBody>
+          <a:bodyPr/>
+          <a:lstStyle/>
+          <a:p>
+            <a:r>
+              <a:rPr lang="en-US" dirty="0"/>
+              <a:t>Backlog</a:t>
+            </a:r>
+          </a:p>
+        </p:txBody>
+      </p:sp>
+      <p:sp>
+        <p:nvSpPr>
+          <p:cNvPr id="3" name="TextBox 2">
+            <a:extLst>
+              <a:ext uri="{FF2B5EF4-FFF2-40B4-BE49-F238E27FC236}">
+                <a16:creationId xmlns:a16="http://schemas.microsoft.com/office/drawing/2014/main" id="{B4CF3260-3AB8-498F-9DEC-68C342A3C7B9}"/>
+              </a:ext>
+            </a:extLst>
+          </p:cNvPr>
+          <p:cNvSpPr txBox="1"/>
+          <p:nvPr/>
+        </p:nvSpPr>
+        <p:spPr>
+          <a:xfrm>
+            <a:off x="0" y="1417638"/>
+            <a:ext cx="6400800" cy="1200329"/>
+          </a:xfrm>
+          <a:prstGeom prst="rect">
+            <a:avLst/>
+          </a:prstGeom>
+          <a:noFill/>
+        </p:spPr>
+        <p:txBody>
+          <a:bodyPr wrap="square" rtlCol="0">
+            <a:spAutoFit/>
+          </a:bodyPr>
+          <a:lstStyle/>
+          <a:p>
+            <a:pPr marL="285750" indent="-285750">
+              <a:buFont typeface="Arial" panose="020B0604020202020204" pitchFamily="34" charset="0"/>
+              <a:buChar char="•"/>
+            </a:pPr>
+            <a:r>
+              <a:rPr lang="en-US" dirty="0"/>
+              <a:t>How we kept track of who was doing what.</a:t>
+            </a:r>
+          </a:p>
+          <a:p>
+            <a:pPr marL="285750" indent="-285750">
+              <a:buFont typeface="Arial" panose="020B0604020202020204" pitchFamily="34" charset="0"/>
+              <a:buChar char="•"/>
+            </a:pPr>
+            <a:r>
+              <a:rPr lang="en-US" dirty="0"/>
+              <a:t>The requirements were divided into tasks.</a:t>
+            </a:r>
+          </a:p>
+          <a:p>
+            <a:pPr marL="285750" indent="-285750">
+              <a:buFont typeface="Arial" panose="020B0604020202020204" pitchFamily="34" charset="0"/>
+              <a:buChar char="•"/>
+            </a:pPr>
+            <a:r>
+              <a:rPr lang="en-US" dirty="0"/>
+              <a:t>Developers self selected tasks from the backlog to complete</a:t>
+            </a:r>
+          </a:p>
+          <a:p>
+            <a:pPr marL="742950" lvl="1" indent="-285750">
+              <a:buFont typeface="Arial" panose="020B0604020202020204" pitchFamily="34" charset="0"/>
+              <a:buChar char="•"/>
+            </a:pPr>
+            <a:r>
+              <a:rPr lang="en-US" dirty="0"/>
+              <a:t>Tasks with higher priority had to be done first</a:t>
+            </a:r>
+          </a:p>
+        </p:txBody>
+      </p:sp>
+      <p:pic>
+        <p:nvPicPr>
+          <p:cNvPr id="5" name="Picture 4">
+            <a:extLst>
+              <a:ext uri="{FF2B5EF4-FFF2-40B4-BE49-F238E27FC236}">
+                <a16:creationId xmlns:a16="http://schemas.microsoft.com/office/drawing/2014/main" id="{80F30078-A849-49C0-A4FF-8ABB9FDCD762}"/>
+              </a:ext>
+            </a:extLst>
+          </p:cNvPr>
+          <p:cNvPicPr>
+            <a:picLocks noChangeAspect="1"/>
+          </p:cNvPicPr>
+          <p:nvPr/>
+        </p:nvPicPr>
+        <p:blipFill>
+          <a:blip r:embed="rId3">
+            <a:extLst>
+              <a:ext uri="{28A0092B-C50C-407E-A947-70E740481C1C}">
+                <a14:useLocalDpi xmlns:a14="http://schemas.microsoft.com/office/drawing/2010/main" val="0"/>
+              </a:ext>
+            </a:extLst>
+          </a:blip>
+          <a:stretch>
+            <a:fillRect/>
+          </a:stretch>
+        </p:blipFill>
+        <p:spPr>
+          <a:xfrm>
+            <a:off x="9331" y="2617967"/>
+            <a:ext cx="4648200" cy="4055087"/>
+          </a:xfrm>
+          <a:prstGeom prst="rect">
+            <a:avLst/>
+          </a:prstGeom>
+        </p:spPr>
+      </p:pic>
+    </p:spTree>
+    <p:extLst>
+      <p:ext uri="{BB962C8B-B14F-4D97-AF65-F5344CB8AC3E}">
+        <p14:creationId xmlns:p14="http://schemas.microsoft.com/office/powerpoint/2010/main" val="2800904959"/>
       </p:ext>
     </p:extLst>
   </p:cSld>

</xml_diff>